<commit_message>
Fix to slide 8
</commit_message>
<xml_diff>
--- a/docs/Architecture/FPrimeSoftwareArchitecture.pptx
+++ b/docs/Architecture/FPrimeSoftwareArchitecture.pptx
@@ -31889,7 +31889,7 @@
         </p:nvSpPr>
         <p:spPr>
           <a:xfrm>
-            <a:off x="609600" y="1390650"/>
+            <a:off x="3446717" y="1220573"/>
             <a:ext cx="2090353" cy="1386002"/>
           </a:xfrm>
           <a:prstGeom prst="roundRect">
@@ -31929,7 +31929,7 @@
         </p:nvSpPr>
         <p:spPr>
           <a:xfrm>
-            <a:off x="870184" y="1444215"/>
+            <a:off x="3707301" y="1274138"/>
             <a:ext cx="1258678" cy="307777"/>
           </a:xfrm>
           <a:prstGeom prst="rect">
@@ -31958,7 +31958,7 @@
         </p:nvSpPr>
         <p:spPr>
           <a:xfrm>
-            <a:off x="878173" y="1896172"/>
+            <a:off x="3715290" y="1726095"/>
             <a:ext cx="254921" cy="301305"/>
           </a:xfrm>
           <a:prstGeom prst="ellipse">
@@ -32004,7 +32004,7 @@
         </p:nvSpPr>
         <p:spPr>
           <a:xfrm>
-            <a:off x="1617955" y="1745520"/>
+            <a:off x="4455072" y="1575443"/>
             <a:ext cx="254921" cy="301305"/>
           </a:xfrm>
           <a:prstGeom prst="ellipse">
@@ -32050,7 +32050,7 @@
         </p:nvSpPr>
         <p:spPr>
           <a:xfrm>
-            <a:off x="1821892" y="2287868"/>
+            <a:off x="4659009" y="2117791"/>
             <a:ext cx="254921" cy="301305"/>
           </a:xfrm>
           <a:prstGeom prst="ellipse">
@@ -32099,7 +32099,7 @@
         </p:nvCxnSpPr>
         <p:spPr>
           <a:xfrm flipV="1">
-            <a:off x="1133094" y="1896172"/>
+            <a:off x="3970211" y="1726095"/>
             <a:ext cx="484861" cy="150652"/>
           </a:xfrm>
           <a:prstGeom prst="line">
@@ -32138,7 +32138,7 @@
         </p:nvCxnSpPr>
         <p:spPr>
           <a:xfrm>
-            <a:off x="1745415" y="2046825"/>
+            <a:off x="4582532" y="1876748"/>
             <a:ext cx="113809" cy="285169"/>
           </a:xfrm>
           <a:prstGeom prst="straightConnector1">
@@ -32177,7 +32177,7 @@
         </p:nvCxnSpPr>
         <p:spPr>
           <a:xfrm flipH="1" flipV="1">
-            <a:off x="1095762" y="2153352"/>
+            <a:off x="3932879" y="1983275"/>
             <a:ext cx="726130" cy="285169"/>
           </a:xfrm>
           <a:prstGeom prst="straightConnector1">
@@ -32216,7 +32216,7 @@
         </p:nvCxnSpPr>
         <p:spPr>
           <a:xfrm rot="16200000" flipH="1">
-            <a:off x="1661890" y="1829046"/>
+            <a:off x="4499007" y="1658969"/>
             <a:ext cx="257180" cy="90128"/>
           </a:xfrm>
           <a:prstGeom prst="curvedConnector5">
@@ -32256,7 +32256,7 @@
         </p:nvSpPr>
         <p:spPr>
           <a:xfrm>
-            <a:off x="878173" y="2776652"/>
+            <a:off x="3715290" y="2606575"/>
             <a:ext cx="178955" cy="113826"/>
           </a:xfrm>
           <a:prstGeom prst="rect">
@@ -32301,7 +32301,7 @@
         </p:nvSpPr>
         <p:spPr>
           <a:xfrm>
-            <a:off x="2127797" y="2783348"/>
+            <a:off x="4964914" y="2613271"/>
             <a:ext cx="178955" cy="113826"/>
           </a:xfrm>
           <a:prstGeom prst="rect">
@@ -32346,7 +32346,7 @@
         </p:nvSpPr>
         <p:spPr>
           <a:xfrm>
-            <a:off x="1109126" y="2806374"/>
+            <a:off x="3946243" y="2636297"/>
             <a:ext cx="662361" cy="307777"/>
           </a:xfrm>
           <a:prstGeom prst="rect">
@@ -32376,7 +32376,7 @@
         </p:nvSpPr>
         <p:spPr>
           <a:xfrm>
-            <a:off x="2343064" y="2799679"/>
+            <a:off x="5180181" y="2629602"/>
             <a:ext cx="662361" cy="307777"/>
           </a:xfrm>
           <a:prstGeom prst="rect">
@@ -32405,7 +32405,7 @@
         </p:nvSpPr>
         <p:spPr>
           <a:xfrm>
-            <a:off x="3832936" y="1502803"/>
+            <a:off x="6670053" y="1332726"/>
             <a:ext cx="2090353" cy="1386002"/>
           </a:xfrm>
           <a:prstGeom prst="roundRect">
@@ -32445,7 +32445,7 @@
         </p:nvSpPr>
         <p:spPr>
           <a:xfrm>
-            <a:off x="4106297" y="1556368"/>
+            <a:off x="6943414" y="1386291"/>
             <a:ext cx="1258678" cy="307777"/>
           </a:xfrm>
           <a:prstGeom prst="rect">
@@ -32474,7 +32474,7 @@
         </p:nvSpPr>
         <p:spPr>
           <a:xfrm>
-            <a:off x="4101509" y="2008325"/>
+            <a:off x="6938626" y="1838248"/>
             <a:ext cx="254921" cy="301305"/>
           </a:xfrm>
           <a:prstGeom prst="ellipse">
@@ -32520,7 +32520,7 @@
         </p:nvSpPr>
         <p:spPr>
           <a:xfrm>
-            <a:off x="4841290" y="1857672"/>
+            <a:off x="7678407" y="1687595"/>
             <a:ext cx="254921" cy="301305"/>
           </a:xfrm>
           <a:prstGeom prst="ellipse">
@@ -32566,7 +32566,7 @@
         </p:nvSpPr>
         <p:spPr>
           <a:xfrm>
-            <a:off x="5045227" y="2400021"/>
+            <a:off x="7882344" y="2229944"/>
             <a:ext cx="254921" cy="301305"/>
           </a:xfrm>
           <a:prstGeom prst="ellipse">
@@ -32615,7 +32615,7 @@
         </p:nvCxnSpPr>
         <p:spPr>
           <a:xfrm flipV="1">
-            <a:off x="4356430" y="2008325"/>
+            <a:off x="7193547" y="1838248"/>
             <a:ext cx="484861" cy="150652"/>
           </a:xfrm>
           <a:prstGeom prst="line">
@@ -32654,7 +32654,7 @@
         </p:nvCxnSpPr>
         <p:spPr>
           <a:xfrm>
-            <a:off x="4968751" y="2158977"/>
+            <a:off x="7805868" y="1988900"/>
             <a:ext cx="113809" cy="285169"/>
           </a:xfrm>
           <a:prstGeom prst="straightConnector1">
@@ -32693,7 +32693,7 @@
         </p:nvCxnSpPr>
         <p:spPr>
           <a:xfrm flipH="1" flipV="1">
-            <a:off x="4319098" y="2265505"/>
+            <a:off x="7156215" y="2095428"/>
             <a:ext cx="726130" cy="285169"/>
           </a:xfrm>
           <a:prstGeom prst="straightConnector1">
@@ -32732,7 +32732,7 @@
         </p:nvCxnSpPr>
         <p:spPr>
           <a:xfrm rot="16200000" flipH="1">
-            <a:off x="4885225" y="1941198"/>
+            <a:off x="7722342" y="1771121"/>
             <a:ext cx="257180" cy="90128"/>
           </a:xfrm>
           <a:prstGeom prst="curvedConnector5">
@@ -32772,7 +32772,7 @@
         </p:nvSpPr>
         <p:spPr>
           <a:xfrm>
-            <a:off x="4101509" y="2888805"/>
+            <a:off x="6938626" y="2718728"/>
             <a:ext cx="178955" cy="113826"/>
           </a:xfrm>
           <a:prstGeom prst="rect">
@@ -32817,7 +32817,7 @@
         </p:nvSpPr>
         <p:spPr>
           <a:xfrm>
-            <a:off x="5351133" y="2895501"/>
+            <a:off x="8188250" y="2725424"/>
             <a:ext cx="178955" cy="113826"/>
           </a:xfrm>
           <a:prstGeom prst="rect">
@@ -32862,7 +32862,7 @@
         </p:nvSpPr>
         <p:spPr>
           <a:xfrm>
-            <a:off x="4304425" y="2947949"/>
+            <a:off x="7141542" y="2777872"/>
             <a:ext cx="500149" cy="292077"/>
           </a:xfrm>
           <a:prstGeom prst="rect">
@@ -32891,7 +32891,7 @@
         </p:nvSpPr>
         <p:spPr>
           <a:xfrm>
-            <a:off x="5555069" y="2939021"/>
+            <a:off x="8392186" y="2768944"/>
             <a:ext cx="662361" cy="307777"/>
           </a:xfrm>
           <a:prstGeom prst="rect">
@@ -32920,7 +32920,7 @@
         </p:nvSpPr>
         <p:spPr>
           <a:xfrm>
-            <a:off x="2162824" y="4268111"/>
+            <a:off x="4999941" y="4098034"/>
             <a:ext cx="2090353" cy="1019714"/>
           </a:xfrm>
           <a:prstGeom prst="roundRect">
@@ -32960,7 +32960,7 @@
         </p:nvSpPr>
         <p:spPr>
           <a:xfrm>
-            <a:off x="2809623" y="5344738"/>
+            <a:off x="5646740" y="5174661"/>
             <a:ext cx="1258678" cy="307777"/>
           </a:xfrm>
           <a:prstGeom prst="rect">
@@ -32989,7 +32989,7 @@
         </p:nvSpPr>
         <p:spPr>
           <a:xfrm>
-            <a:off x="2431397" y="4491449"/>
+            <a:off x="5268514" y="4321372"/>
             <a:ext cx="254921" cy="301305"/>
           </a:xfrm>
           <a:prstGeom prst="ellipse">
@@ -33035,7 +33035,7 @@
         </p:nvSpPr>
         <p:spPr>
           <a:xfrm>
-            <a:off x="3171179" y="4340796"/>
+            <a:off x="6008296" y="4170719"/>
             <a:ext cx="254921" cy="301305"/>
           </a:xfrm>
           <a:prstGeom prst="ellipse">
@@ -33081,7 +33081,7 @@
         </p:nvSpPr>
         <p:spPr>
           <a:xfrm>
-            <a:off x="3375116" y="4883145"/>
+            <a:off x="6212233" y="4713068"/>
             <a:ext cx="254921" cy="301305"/>
           </a:xfrm>
           <a:prstGeom prst="ellipse">
@@ -33130,7 +33130,7 @@
         </p:nvCxnSpPr>
         <p:spPr>
           <a:xfrm flipV="1">
-            <a:off x="2686318" y="4491449"/>
+            <a:off x="5523435" y="4321372"/>
             <a:ext cx="484861" cy="150652"/>
           </a:xfrm>
           <a:prstGeom prst="line">
@@ -33169,7 +33169,7 @@
         </p:nvCxnSpPr>
         <p:spPr>
           <a:xfrm>
-            <a:off x="3298640" y="4642101"/>
+            <a:off x="6135757" y="4472024"/>
             <a:ext cx="113809" cy="285169"/>
           </a:xfrm>
           <a:prstGeom prst="straightConnector1">
@@ -33208,7 +33208,7 @@
         </p:nvCxnSpPr>
         <p:spPr>
           <a:xfrm flipH="1" flipV="1">
-            <a:off x="2648986" y="4748629"/>
+            <a:off x="5486103" y="4578552"/>
             <a:ext cx="726130" cy="285169"/>
           </a:xfrm>
           <a:prstGeom prst="straightConnector1">
@@ -33247,7 +33247,7 @@
         </p:nvCxnSpPr>
         <p:spPr>
           <a:xfrm rot="16200000" flipH="1">
-            <a:off x="3215114" y="4424322"/>
+            <a:off x="6052231" y="4254245"/>
             <a:ext cx="257180" cy="90128"/>
           </a:xfrm>
           <a:prstGeom prst="curvedConnector5">
@@ -33287,7 +33287,7 @@
         </p:nvSpPr>
         <p:spPr>
           <a:xfrm>
-            <a:off x="2414183" y="4160722"/>
+            <a:off x="5251300" y="3990645"/>
             <a:ext cx="178955" cy="113826"/>
           </a:xfrm>
           <a:prstGeom prst="rect">
@@ -33332,7 +33332,7 @@
         </p:nvSpPr>
         <p:spPr>
           <a:xfrm>
-            <a:off x="1662358" y="3900073"/>
+            <a:off x="4499475" y="3729996"/>
             <a:ext cx="662361" cy="307777"/>
           </a:xfrm>
           <a:prstGeom prst="rect">
@@ -33361,7 +33361,7 @@
         </p:nvSpPr>
         <p:spPr>
           <a:xfrm>
-            <a:off x="4142213" y="3911156"/>
+            <a:off x="6979330" y="3741079"/>
             <a:ext cx="662361" cy="307777"/>
           </a:xfrm>
           <a:prstGeom prst="rect">
@@ -33390,7 +33390,7 @@
         </p:nvSpPr>
         <p:spPr>
           <a:xfrm>
-            <a:off x="3745346" y="4147589"/>
+            <a:off x="6582463" y="3977512"/>
             <a:ext cx="175179" cy="120522"/>
           </a:xfrm>
           <a:prstGeom prst="rect">
@@ -33438,7 +33438,7 @@
         </p:nvCxnSpPr>
         <p:spPr>
           <a:xfrm rot="16200000" flipH="1">
-            <a:off x="3144707" y="713423"/>
+            <a:off x="5981824" y="543346"/>
             <a:ext cx="118849" cy="4472959"/>
           </a:xfrm>
           <a:prstGeom prst="bentConnector3">
@@ -33476,7 +33476,7 @@
         </p:nvCxnSpPr>
         <p:spPr>
           <a:xfrm rot="16200000" flipH="1">
-            <a:off x="1728694" y="3385755"/>
+            <a:off x="4565811" y="3215678"/>
             <a:ext cx="1263548" cy="286385"/>
           </a:xfrm>
           <a:prstGeom prst="bentConnector3">
@@ -33514,7 +33514,7 @@
         </p:nvCxnSpPr>
         <p:spPr>
           <a:xfrm rot="5400000" flipH="1" flipV="1">
-            <a:off x="3439482" y="3396084"/>
+            <a:off x="6276599" y="3226007"/>
             <a:ext cx="1144958" cy="358051"/>
           </a:xfrm>
           <a:prstGeom prst="bentConnector3">
@@ -33553,8 +33553,8 @@
         </p:nvSpPr>
         <p:spPr>
           <a:xfrm>
-            <a:off x="4844162" y="3577424"/>
-            <a:ext cx="4015064" cy="3022568"/>
+            <a:off x="215310" y="1326877"/>
+            <a:ext cx="3004333" cy="5137838"/>
           </a:xfrm>
         </p:spPr>
         <p:txBody>

</xml_diff>